<commit_message>
Implemented feedback from Papa.
</commit_message>
<xml_diff>
--- a/src/resources/Datenfluss-SRG.pptx
+++ b/src/resources/Datenfluss-SRG.pptx
@@ -254,7 +254,7 @@
           <a:p>
             <a:fld id="{2AAD4EE2-36AE-4A87-B60E-9EA182317EA9}" type="datetimeFigureOut">
               <a:rPr lang="de-DE" smtClean="0"/>
-              <a:t>14.07.2018</a:t>
+              <a:t>18.07.2018</a:t>
             </a:fld>
             <a:endParaRPr lang="de-DE"/>
           </a:p>
@@ -424,7 +424,7 @@
           <a:p>
             <a:fld id="{2AAD4EE2-36AE-4A87-B60E-9EA182317EA9}" type="datetimeFigureOut">
               <a:rPr lang="de-DE" smtClean="0"/>
-              <a:t>14.07.2018</a:t>
+              <a:t>18.07.2018</a:t>
             </a:fld>
             <a:endParaRPr lang="de-DE"/>
           </a:p>
@@ -604,7 +604,7 @@
           <a:p>
             <a:fld id="{2AAD4EE2-36AE-4A87-B60E-9EA182317EA9}" type="datetimeFigureOut">
               <a:rPr lang="de-DE" smtClean="0"/>
-              <a:t>14.07.2018</a:t>
+              <a:t>18.07.2018</a:t>
             </a:fld>
             <a:endParaRPr lang="de-DE"/>
           </a:p>
@@ -774,7 +774,7 @@
           <a:p>
             <a:fld id="{2AAD4EE2-36AE-4A87-B60E-9EA182317EA9}" type="datetimeFigureOut">
               <a:rPr lang="de-DE" smtClean="0"/>
-              <a:t>14.07.2018</a:t>
+              <a:t>18.07.2018</a:t>
             </a:fld>
             <a:endParaRPr lang="de-DE"/>
           </a:p>
@@ -1020,7 +1020,7 @@
           <a:p>
             <a:fld id="{2AAD4EE2-36AE-4A87-B60E-9EA182317EA9}" type="datetimeFigureOut">
               <a:rPr lang="de-DE" smtClean="0"/>
-              <a:t>14.07.2018</a:t>
+              <a:t>18.07.2018</a:t>
             </a:fld>
             <a:endParaRPr lang="de-DE"/>
           </a:p>
@@ -1252,7 +1252,7 @@
           <a:p>
             <a:fld id="{2AAD4EE2-36AE-4A87-B60E-9EA182317EA9}" type="datetimeFigureOut">
               <a:rPr lang="de-DE" smtClean="0"/>
-              <a:t>14.07.2018</a:t>
+              <a:t>18.07.2018</a:t>
             </a:fld>
             <a:endParaRPr lang="de-DE"/>
           </a:p>
@@ -1619,7 +1619,7 @@
           <a:p>
             <a:fld id="{2AAD4EE2-36AE-4A87-B60E-9EA182317EA9}" type="datetimeFigureOut">
               <a:rPr lang="de-DE" smtClean="0"/>
-              <a:t>14.07.2018</a:t>
+              <a:t>18.07.2018</a:t>
             </a:fld>
             <a:endParaRPr lang="de-DE"/>
           </a:p>
@@ -1737,7 +1737,7 @@
           <a:p>
             <a:fld id="{2AAD4EE2-36AE-4A87-B60E-9EA182317EA9}" type="datetimeFigureOut">
               <a:rPr lang="de-DE" smtClean="0"/>
-              <a:t>14.07.2018</a:t>
+              <a:t>18.07.2018</a:t>
             </a:fld>
             <a:endParaRPr lang="de-DE"/>
           </a:p>
@@ -1832,7 +1832,7 @@
           <a:p>
             <a:fld id="{2AAD4EE2-36AE-4A87-B60E-9EA182317EA9}" type="datetimeFigureOut">
               <a:rPr lang="de-DE" smtClean="0"/>
-              <a:t>14.07.2018</a:t>
+              <a:t>18.07.2018</a:t>
             </a:fld>
             <a:endParaRPr lang="de-DE"/>
           </a:p>
@@ -2109,7 +2109,7 @@
           <a:p>
             <a:fld id="{2AAD4EE2-36AE-4A87-B60E-9EA182317EA9}" type="datetimeFigureOut">
               <a:rPr lang="de-DE" smtClean="0"/>
-              <a:t>14.07.2018</a:t>
+              <a:t>18.07.2018</a:t>
             </a:fld>
             <a:endParaRPr lang="de-DE"/>
           </a:p>
@@ -2362,7 +2362,7 @@
           <a:p>
             <a:fld id="{2AAD4EE2-36AE-4A87-B60E-9EA182317EA9}" type="datetimeFigureOut">
               <a:rPr lang="de-DE" smtClean="0"/>
-              <a:t>14.07.2018</a:t>
+              <a:t>18.07.2018</a:t>
             </a:fld>
             <a:endParaRPr lang="de-DE"/>
           </a:p>
@@ -2575,7 +2575,7 @@
           <a:p>
             <a:fld id="{2AAD4EE2-36AE-4A87-B60E-9EA182317EA9}" type="datetimeFigureOut">
               <a:rPr lang="de-DE" smtClean="0"/>
-              <a:t>14.07.2018</a:t>
+              <a:t>18.07.2018</a:t>
             </a:fld>
             <a:endParaRPr lang="de-DE"/>
           </a:p>
@@ -4032,8 +4032,8 @@
             </p:txBody>
           </p:sp>
         </p:grpSp>
-        <mc:AlternateContent xmlns:mc="http://schemas.openxmlformats.org/markup-compatibility/2006">
-          <mc:Choice xmlns:a14="http://schemas.microsoft.com/office/drawing/2010/main" Requires="a14">
+        <mc:AlternateContent xmlns:mc="http://schemas.openxmlformats.org/markup-compatibility/2006" xmlns:a14="http://schemas.microsoft.com/office/drawing/2010/main">
+          <mc:Choice Requires="a14">
             <p:sp>
               <p:nvSpPr>
                 <p:cNvPr id="31" name="Rechteck 30"/>
@@ -4258,12 +4258,11 @@
                     <a:rPr lang="de-DE" sz="1400" b="0" dirty="0" smtClean="0"/>
                     <a:t>        …</a:t>
                   </a:r>
-                  <a:endParaRPr lang="de-DE" sz="1400" b="0" dirty="0" smtClean="0"/>
                 </a:p>
               </p:txBody>
             </p:sp>
           </mc:Choice>
-          <mc:Fallback>
+          <mc:Fallback xmlns="">
             <p:sp>
               <p:nvSpPr>
                 <p:cNvPr id="31" name="Rechteck 30"/>
@@ -4334,8 +4333,8 @@
                 <a:t> für die einzelnen </a:t>
               </a:r>
               <a:r>
-                <a:rPr lang="de-DE" sz="2400" dirty="0" err="1" smtClean="0"/>
-                <a:t>Angbeote</a:t>
+                <a:rPr lang="de-DE" sz="2400" dirty="0" smtClean="0"/>
+                <a:t>Angebote</a:t>
               </a:r>
               <a:endParaRPr lang="de-DE" sz="2400" dirty="0"/>
             </a:p>

</xml_diff>